<commit_message>
URI URL arasindaki fark ödevi yapıldı.
</commit_message>
<xml_diff>
--- a/Turkcell_bootcamp_ArdaKozan.pptx
+++ b/Turkcell_bootcamp_ArdaKozan.pptx
@@ -119,6 +119,9 @@
     <p:sldId id="368" r:id="rId113"/>
     <p:sldId id="369" r:id="rId114"/>
     <p:sldId id="370" r:id="rId115"/>
+    <p:sldId id="373" r:id="rId116"/>
+    <p:sldId id="371" r:id="rId117"/>
+    <p:sldId id="372" r:id="rId118"/>
   </p:sldIdLst>
   <p:sldSz cx="12192000" cy="6858000"/>
   <p:notesSz cx="6858000" cy="9144000"/>
@@ -625,6 +628,16 @@
             <p14:sldId id="370"/>
           </p14:sldIdLst>
         </p14:section>
+        <p14:section name="29 Haziran 2022" id="{5BBA45D7-312C-4071-8144-BC32A9928C71}">
+          <p14:sldIdLst/>
+        </p14:section>
+        <p14:section name="1. Soru (URL URI farkı)" id="{229B57DE-C07C-4876-B080-BD7E134FAD8E}">
+          <p14:sldIdLst>
+            <p14:sldId id="373"/>
+            <p14:sldId id="371"/>
+            <p14:sldId id="372"/>
+          </p14:sldIdLst>
+        </p14:section>
       </p14:sectionLst>
     </p:ext>
     <p:ext uri="{EFAFB233-063F-42B5-8137-9DF3F51BA10A}">
@@ -797,7 +810,7 @@
           <a:p>
             <a:fld id="{1160EA64-D806-43AC-9DF2-F8C432F32B4C}" type="datetimeFigureOut">
               <a:rPr lang="en-US" dirty="0"/>
-              <a:t>6/29/2022</a:t>
+              <a:t>6/30/2022</a:t>
             </a:fld>
             <a:endParaRPr lang="en-US" dirty="0"/>
           </a:p>
@@ -963,7 +976,7 @@
           <a:p>
             <a:fld id="{E9F9C37B-1D36-470B-8223-D6C91242EC14}" type="datetimeFigureOut">
               <a:rPr lang="en-US" dirty="0"/>
-              <a:t>6/29/2022</a:t>
+              <a:t>6/30/2022</a:t>
             </a:fld>
             <a:endParaRPr lang="en-US" dirty="0"/>
           </a:p>
@@ -1138,7 +1151,7 @@
           <a:p>
             <a:fld id="{67C6F52A-A82B-47A2-A83A-8C4C91F2D59F}" type="datetimeFigureOut">
               <a:rPr lang="en-US" dirty="0"/>
-              <a:t>6/29/2022</a:t>
+              <a:t>6/30/2022</a:t>
             </a:fld>
             <a:endParaRPr lang="en-US" dirty="0"/>
           </a:p>
@@ -1303,7 +1316,7 @@
           <a:p>
             <a:fld id="{F070A7B3-6521-4DCA-87E5-044747A908C1}" type="datetimeFigureOut">
               <a:rPr lang="en-US" dirty="0"/>
-              <a:t>6/29/2022</a:t>
+              <a:t>6/30/2022</a:t>
             </a:fld>
             <a:endParaRPr lang="en-US" dirty="0"/>
           </a:p>
@@ -1567,7 +1580,7 @@
           <a:p>
             <a:fld id="{1160EA64-D806-43AC-9DF2-F8C432F32B4C}" type="datetimeFigureOut">
               <a:rPr lang="en-US" dirty="0"/>
-              <a:t>6/29/2022</a:t>
+              <a:t>6/30/2022</a:t>
             </a:fld>
             <a:endParaRPr lang="en-US" dirty="0"/>
           </a:p>
@@ -1795,7 +1808,7 @@
           <a:p>
             <a:fld id="{AB134690-1557-4C89-A502-4959FE7FAD70}" type="datetimeFigureOut">
               <a:rPr lang="en-US" dirty="0"/>
-              <a:t>6/29/2022</a:t>
+              <a:t>6/30/2022</a:t>
             </a:fld>
             <a:endParaRPr lang="en-US" dirty="0"/>
           </a:p>
@@ -2149,7 +2162,7 @@
           <a:p>
             <a:fld id="{4F7D4976-E339-4826-83B7-FBD03F55ECF8}" type="datetimeFigureOut">
               <a:rPr lang="en-US" dirty="0"/>
-              <a:t>6/29/2022</a:t>
+              <a:t>6/30/2022</a:t>
             </a:fld>
             <a:endParaRPr lang="en-US" dirty="0"/>
           </a:p>
@@ -2285,7 +2298,7 @@
           <a:p>
             <a:fld id="{E1037C31-9E7A-4F99-8774-A0E530DE1A42}" type="datetimeFigureOut">
               <a:rPr lang="en-US" dirty="0"/>
-              <a:t>6/29/2022</a:t>
+              <a:t>6/30/2022</a:t>
             </a:fld>
             <a:endParaRPr lang="en-US" dirty="0"/>
           </a:p>
@@ -2375,7 +2388,7 @@
           <a:p>
             <a:fld id="{C278504F-A551-4DE0-9316-4DCD1D8CC752}" type="datetimeFigureOut">
               <a:rPr lang="en-US" dirty="0"/>
-              <a:t>6/29/2022</a:t>
+              <a:t>6/30/2022</a:t>
             </a:fld>
             <a:endParaRPr lang="en-US" dirty="0"/>
           </a:p>
@@ -2727,7 +2740,7 @@
           <a:p>
             <a:fld id="{D1BE4249-C0D0-4B06-8692-E8BB871AF643}" type="datetimeFigureOut">
               <a:rPr lang="en-US" dirty="0"/>
-              <a:t>6/29/2022</a:t>
+              <a:t>6/30/2022</a:t>
             </a:fld>
             <a:endParaRPr lang="en-US" dirty="0"/>
           </a:p>
@@ -3079,7 +3092,7 @@
           <a:p>
             <a:fld id="{042B0DB6-F5C7-45FB-8CF3-31B45F9C2DAC}" type="datetimeFigureOut">
               <a:rPr lang="en-US" dirty="0"/>
-              <a:t>6/29/2022</a:t>
+              <a:t>6/30/2022</a:t>
             </a:fld>
             <a:endParaRPr lang="en-US" dirty="0"/>
           </a:p>
@@ -3315,7 +3328,7 @@
           <a:p>
             <a:fld id="{1160EA64-D806-43AC-9DF2-F8C432F32B4C}" type="datetimeFigureOut">
               <a:rPr lang="en-US" dirty="0"/>
-              <a:t>6/29/2022</a:t>
+              <a:t>6/30/2022</a:t>
             </a:fld>
             <a:endParaRPr lang="en-US" dirty="0"/>
           </a:p>
@@ -7046,6 +7059,419 @@
 </p:sld>
 </file>
 
+<file path=ppt/slides/slide115.xml><?xml version="1.0" encoding="utf-8"?>
+<p:sld xmlns:a="http://schemas.openxmlformats.org/drawingml/2006/main" xmlns:r="http://schemas.openxmlformats.org/officeDocument/2006/relationships" xmlns:p="http://schemas.openxmlformats.org/presentationml/2006/main">
+  <p:cSld>
+    <p:spTree>
+      <p:nvGrpSpPr>
+        <p:cNvPr id="1" name=""/>
+        <p:cNvGrpSpPr/>
+        <p:nvPr/>
+      </p:nvGrpSpPr>
+      <p:grpSpPr>
+        <a:xfrm>
+          <a:off x="0" y="0"/>
+          <a:ext cx="0" cy="0"/>
+          <a:chOff x="0" y="0"/>
+          <a:chExt cx="0" cy="0"/>
+        </a:xfrm>
+      </p:grpSpPr>
+      <p:sp>
+        <p:nvSpPr>
+          <p:cNvPr id="2" name="Title 1">
+            <a:extLst>
+              <a:ext uri="{FF2B5EF4-FFF2-40B4-BE49-F238E27FC236}">
+                <a16:creationId xmlns:a16="http://schemas.microsoft.com/office/drawing/2014/main" id="{5B8FD754-1EBE-4713-9E4C-47923427D1A5}"/>
+              </a:ext>
+            </a:extLst>
+          </p:cNvPr>
+          <p:cNvSpPr>
+            <a:spLocks noGrp="1"/>
+          </p:cNvSpPr>
+          <p:nvPr>
+            <p:ph type="title"/>
+          </p:nvPr>
+        </p:nvSpPr>
+        <p:spPr/>
+        <p:txBody>
+          <a:bodyPr/>
+          <a:lstStyle/>
+          <a:p>
+            <a:r>
+              <a:rPr lang="tr-TR" dirty="0" err="1"/>
+              <a:t>Unıform</a:t>
+            </a:r>
+            <a:r>
+              <a:rPr lang="tr-TR" dirty="0"/>
+              <a:t> </a:t>
+            </a:r>
+            <a:r>
+              <a:rPr lang="tr-TR" dirty="0" err="1"/>
+              <a:t>resource</a:t>
+            </a:r>
+            <a:r>
+              <a:rPr lang="tr-TR" dirty="0"/>
+              <a:t> </a:t>
+            </a:r>
+            <a:r>
+              <a:rPr lang="tr-TR" dirty="0" err="1"/>
+              <a:t>ıdentıfıer</a:t>
+            </a:r>
+            <a:r>
+              <a:rPr lang="tr-TR" dirty="0"/>
+              <a:t> (</a:t>
+            </a:r>
+            <a:r>
+              <a:rPr lang="tr-TR" dirty="0" err="1"/>
+              <a:t>urı</a:t>
+            </a:r>
+            <a:r>
+              <a:rPr lang="tr-TR" dirty="0"/>
+              <a:t>)</a:t>
+            </a:r>
+          </a:p>
+        </p:txBody>
+      </p:sp>
+      <p:sp>
+        <p:nvSpPr>
+          <p:cNvPr id="3" name="Content Placeholder 2">
+            <a:extLst>
+              <a:ext uri="{FF2B5EF4-FFF2-40B4-BE49-F238E27FC236}">
+                <a16:creationId xmlns:a16="http://schemas.microsoft.com/office/drawing/2014/main" id="{0C71058E-B05D-4364-8B63-8E4CBA0654FB}"/>
+              </a:ext>
+            </a:extLst>
+          </p:cNvPr>
+          <p:cNvSpPr>
+            <a:spLocks noGrp="1"/>
+          </p:cNvSpPr>
+          <p:nvPr>
+            <p:ph idx="1"/>
+          </p:nvPr>
+        </p:nvSpPr>
+        <p:spPr/>
+        <p:txBody>
+          <a:bodyPr/>
+          <a:lstStyle/>
+          <a:p>
+            <a:pPr marL="0" indent="0">
+              <a:buNone/>
+            </a:pPr>
+            <a:r>
+              <a:rPr lang="tr-TR" dirty="0"/>
+              <a:t>URI, Türkçesi tekdüzen kaynak tanımlayıcıdır. URI, bir web kaynağını konuma (URL), ada (URN) veya her ikisine göre tanımlayan bir karakter dizisidir. URI benzersiz bir kaynağı işaret eder.</a:t>
+            </a:r>
+          </a:p>
+          <a:p>
+            <a:r>
+              <a:rPr lang="tr-TR" dirty="0"/>
+              <a:t>URN: </a:t>
+            </a:r>
+            <a:r>
+              <a:rPr lang="tr-TR" dirty="0" err="1"/>
+              <a:t>Uniform</a:t>
+            </a:r>
+            <a:r>
+              <a:rPr lang="tr-TR" dirty="0"/>
+              <a:t> </a:t>
+            </a:r>
+            <a:r>
+              <a:rPr lang="tr-TR" dirty="0" err="1"/>
+              <a:t>resource</a:t>
+            </a:r>
+            <a:r>
+              <a:rPr lang="tr-TR" dirty="0"/>
+              <a:t> name olan ve Türkçesi tekdüzen kaynak ismidir. Bir kaynağı isim ile tanımlar ancak nasıl elde edileceğini tanımlamaz. </a:t>
+            </a:r>
+          </a:p>
+        </p:txBody>
+      </p:sp>
+    </p:spTree>
+    <p:extLst>
+      <p:ext uri="{BB962C8B-B14F-4D97-AF65-F5344CB8AC3E}">
+        <p14:creationId xmlns:p14="http://schemas.microsoft.com/office/powerpoint/2010/main" val="1768230433"/>
+      </p:ext>
+    </p:extLst>
+  </p:cSld>
+  <p:clrMapOvr>
+    <a:masterClrMapping/>
+  </p:clrMapOvr>
+</p:sld>
+</file>
+
+<file path=ppt/slides/slide116.xml><?xml version="1.0" encoding="utf-8"?>
+<p:sld xmlns:a="http://schemas.openxmlformats.org/drawingml/2006/main" xmlns:r="http://schemas.openxmlformats.org/officeDocument/2006/relationships" xmlns:p="http://schemas.openxmlformats.org/presentationml/2006/main">
+  <p:cSld>
+    <p:spTree>
+      <p:nvGrpSpPr>
+        <p:cNvPr id="1" name=""/>
+        <p:cNvGrpSpPr/>
+        <p:nvPr/>
+      </p:nvGrpSpPr>
+      <p:grpSpPr>
+        <a:xfrm>
+          <a:off x="0" y="0"/>
+          <a:ext cx="0" cy="0"/>
+          <a:chOff x="0" y="0"/>
+          <a:chExt cx="0" cy="0"/>
+        </a:xfrm>
+      </p:grpSpPr>
+      <p:sp>
+        <p:nvSpPr>
+          <p:cNvPr id="2" name="Title 1">
+            <a:extLst>
+              <a:ext uri="{FF2B5EF4-FFF2-40B4-BE49-F238E27FC236}">
+                <a16:creationId xmlns:a16="http://schemas.microsoft.com/office/drawing/2014/main" id="{5EBEC258-31C0-467E-8AB3-7BC7D49B05ED}"/>
+              </a:ext>
+            </a:extLst>
+          </p:cNvPr>
+          <p:cNvSpPr>
+            <a:spLocks noGrp="1"/>
+          </p:cNvSpPr>
+          <p:nvPr>
+            <p:ph type="title"/>
+          </p:nvPr>
+        </p:nvSpPr>
+        <p:spPr/>
+        <p:txBody>
+          <a:bodyPr/>
+          <a:lstStyle/>
+          <a:p>
+            <a:r>
+              <a:rPr lang="tr-TR" dirty="0" err="1"/>
+              <a:t>Unıform</a:t>
+            </a:r>
+            <a:r>
+              <a:rPr lang="tr-TR" dirty="0"/>
+              <a:t> </a:t>
+            </a:r>
+            <a:r>
+              <a:rPr lang="tr-TR" dirty="0" err="1"/>
+              <a:t>resource</a:t>
+            </a:r>
+            <a:r>
+              <a:rPr lang="tr-TR" dirty="0"/>
+              <a:t> </a:t>
+            </a:r>
+            <a:r>
+              <a:rPr lang="tr-TR" dirty="0" err="1"/>
+              <a:t>locator</a:t>
+            </a:r>
+            <a:r>
+              <a:rPr lang="tr-TR" dirty="0"/>
+              <a:t> (</a:t>
+            </a:r>
+            <a:r>
+              <a:rPr lang="tr-TR" dirty="0" err="1"/>
+              <a:t>url</a:t>
+            </a:r>
+            <a:r>
+              <a:rPr lang="tr-TR" dirty="0"/>
+              <a:t>)</a:t>
+            </a:r>
+          </a:p>
+        </p:txBody>
+      </p:sp>
+      <p:sp>
+        <p:nvSpPr>
+          <p:cNvPr id="3" name="Content Placeholder 2">
+            <a:extLst>
+              <a:ext uri="{FF2B5EF4-FFF2-40B4-BE49-F238E27FC236}">
+                <a16:creationId xmlns:a16="http://schemas.microsoft.com/office/drawing/2014/main" id="{DF8E72EB-F690-4B60-99ED-8C77A8DF41F5}"/>
+              </a:ext>
+            </a:extLst>
+          </p:cNvPr>
+          <p:cNvSpPr>
+            <a:spLocks noGrp="1"/>
+          </p:cNvSpPr>
+          <p:nvPr>
+            <p:ph idx="1"/>
+          </p:nvPr>
+        </p:nvSpPr>
+        <p:spPr>
+          <a:xfrm>
+            <a:off x="2231136" y="2638044"/>
+            <a:ext cx="7729728" cy="3499145"/>
+          </a:xfrm>
+        </p:spPr>
+        <p:txBody>
+          <a:bodyPr>
+            <a:normAutofit/>
+          </a:bodyPr>
+          <a:lstStyle/>
+          <a:p>
+            <a:pPr marL="0" indent="0">
+              <a:buNone/>
+            </a:pPr>
+            <a:r>
+              <a:rPr lang="tr-TR" dirty="0"/>
+              <a:t>URL, Türkçe karşılığı tekdüzen kaynak bulucudur. Internet üzerinde herhangi bir kaynağa ulaşmak için ip adreslerine yerine kullanılmaktadır. İsminden de anlaşılabileceği üzere kaynak adresi ve kaynağa hangi protokollerle ulaşabileceğini belirtir. URL içerisinde protokol,  domain ve yol yer almaktadır. </a:t>
+            </a:r>
+          </a:p>
+        </p:txBody>
+      </p:sp>
+    </p:spTree>
+    <p:extLst>
+      <p:ext uri="{BB962C8B-B14F-4D97-AF65-F5344CB8AC3E}">
+        <p14:creationId xmlns:p14="http://schemas.microsoft.com/office/powerpoint/2010/main" val="1625534648"/>
+      </p:ext>
+    </p:extLst>
+  </p:cSld>
+  <p:clrMapOvr>
+    <a:masterClrMapping/>
+  </p:clrMapOvr>
+</p:sld>
+</file>
+
+<file path=ppt/slides/slide117.xml><?xml version="1.0" encoding="utf-8"?>
+<p:sld xmlns:a="http://schemas.openxmlformats.org/drawingml/2006/main" xmlns:r="http://schemas.openxmlformats.org/officeDocument/2006/relationships" xmlns:p="http://schemas.openxmlformats.org/presentationml/2006/main">
+  <p:cSld>
+    <p:spTree>
+      <p:nvGrpSpPr>
+        <p:cNvPr id="1" name=""/>
+        <p:cNvGrpSpPr/>
+        <p:nvPr/>
+      </p:nvGrpSpPr>
+      <p:grpSpPr>
+        <a:xfrm>
+          <a:off x="0" y="0"/>
+          <a:ext cx="0" cy="0"/>
+          <a:chOff x="0" y="0"/>
+          <a:chExt cx="0" cy="0"/>
+        </a:xfrm>
+      </p:grpSpPr>
+      <p:sp>
+        <p:nvSpPr>
+          <p:cNvPr id="2" name="Title 1">
+            <a:extLst>
+              <a:ext uri="{FF2B5EF4-FFF2-40B4-BE49-F238E27FC236}">
+                <a16:creationId xmlns:a16="http://schemas.microsoft.com/office/drawing/2014/main" id="{30F08F40-7462-417A-B49A-33D9600C7704}"/>
+              </a:ext>
+            </a:extLst>
+          </p:cNvPr>
+          <p:cNvSpPr>
+            <a:spLocks noGrp="1"/>
+          </p:cNvSpPr>
+          <p:nvPr>
+            <p:ph type="title"/>
+          </p:nvPr>
+        </p:nvSpPr>
+        <p:spPr/>
+        <p:txBody>
+          <a:bodyPr/>
+          <a:lstStyle/>
+          <a:p>
+            <a:r>
+              <a:rPr lang="tr-TR" dirty="0" err="1"/>
+              <a:t>Urı</a:t>
+            </a:r>
+            <a:r>
+              <a:rPr lang="tr-TR" dirty="0"/>
+              <a:t> – </a:t>
+            </a:r>
+            <a:r>
+              <a:rPr lang="tr-TR" dirty="0" err="1"/>
+              <a:t>url</a:t>
+            </a:r>
+            <a:r>
+              <a:rPr lang="tr-TR" dirty="0"/>
+              <a:t> arasındaki fark</a:t>
+            </a:r>
+          </a:p>
+        </p:txBody>
+      </p:sp>
+      <p:sp>
+        <p:nvSpPr>
+          <p:cNvPr id="3" name="Content Placeholder 2">
+            <a:extLst>
+              <a:ext uri="{FF2B5EF4-FFF2-40B4-BE49-F238E27FC236}">
+                <a16:creationId xmlns:a16="http://schemas.microsoft.com/office/drawing/2014/main" id="{1406A6C3-F4AC-49AF-97DE-BC90D5CFD6E0}"/>
+              </a:ext>
+            </a:extLst>
+          </p:cNvPr>
+          <p:cNvSpPr>
+            <a:spLocks noGrp="1"/>
+          </p:cNvSpPr>
+          <p:nvPr>
+            <p:ph idx="1"/>
+          </p:nvPr>
+        </p:nvSpPr>
+        <p:spPr/>
+        <p:txBody>
+          <a:bodyPr/>
+          <a:lstStyle/>
+          <a:p>
+            <a:r>
+              <a:rPr lang="tr-TR" dirty="0"/>
+              <a:t>URI internette bir kaynağı konuma, ada veya her ikisine göre tanımlamak için kullanılır. URL ise internette bir kaynağı konuma göre tanımlamak için kullanılır.</a:t>
+            </a:r>
+          </a:p>
+          <a:p>
+            <a:r>
+              <a:rPr lang="tr-TR" dirty="0"/>
+              <a:t>URI, URL’in üst kümesidir. Eğer bir URI bir kaynağı konuma göre tanımlarsa aynı zamanda bir URL, ada göre tanımlarsa aynı zamanda bir </a:t>
+            </a:r>
+            <a:r>
+              <a:rPr lang="tr-TR" dirty="0" err="1"/>
+              <a:t>URN’dır</a:t>
+            </a:r>
+            <a:r>
+              <a:rPr lang="tr-TR" dirty="0"/>
+              <a:t>. Kısacası URN ve URL, URI’ </a:t>
+            </a:r>
+            <a:r>
+              <a:rPr lang="tr-TR" dirty="0" err="1"/>
+              <a:t>ın</a:t>
+            </a:r>
+            <a:r>
+              <a:rPr lang="tr-TR" dirty="0"/>
+              <a:t> alt kümeleridir.  Yani tüm URL’ler </a:t>
+            </a:r>
+            <a:r>
+              <a:rPr lang="tr-TR" dirty="0" err="1"/>
+              <a:t>URI’dir</a:t>
+            </a:r>
+            <a:r>
+              <a:rPr lang="tr-TR" dirty="0"/>
+              <a:t> ancak tüm </a:t>
+            </a:r>
+            <a:r>
+              <a:rPr lang="tr-TR" dirty="0" err="1"/>
+              <a:t>URI’ler</a:t>
+            </a:r>
+            <a:r>
+              <a:rPr lang="tr-TR" dirty="0"/>
+              <a:t> URL değildir.</a:t>
+            </a:r>
+          </a:p>
+          <a:p>
+            <a:r>
+              <a:rPr lang="tr-TR" dirty="0"/>
+              <a:t>URI kullanılan yöntemden bağımsız olarak bir kaynağı diğerinden ayırmak için kullanılır. URL bir web sayfasına protokoller gibi erişim yöntemleriyle bağlanma amacıyla kullanılır. Bundan dolayı URL’de protokoller bulunurken </a:t>
+            </a:r>
+            <a:r>
+              <a:rPr lang="tr-TR" dirty="0" err="1"/>
+              <a:t>URI’de</a:t>
+            </a:r>
+            <a:r>
+              <a:rPr lang="tr-TR" dirty="0"/>
+              <a:t> protokoller bulunmaz.</a:t>
+            </a:r>
+          </a:p>
+        </p:txBody>
+      </p:sp>
+    </p:spTree>
+    <p:extLst>
+      <p:ext uri="{BB962C8B-B14F-4D97-AF65-F5344CB8AC3E}">
+        <p14:creationId xmlns:p14="http://schemas.microsoft.com/office/powerpoint/2010/main" val="1712817658"/>
+      </p:ext>
+    </p:extLst>
+  </p:cSld>
+  <p:clrMapOvr>
+    <a:masterClrMapping/>
+  </p:clrMapOvr>
+</p:sld>
+</file>
+
 <file path=ppt/slides/slide12.xml><?xml version="1.0" encoding="utf-8"?>
 <p:sld xmlns:a="http://schemas.openxmlformats.org/drawingml/2006/main" xmlns:r="http://schemas.openxmlformats.org/officeDocument/2006/relationships" xmlns:p="http://schemas.openxmlformats.org/presentationml/2006/main">
   <p:cSld>

</xml_diff>